<commit_message>
critique and final ppt
</commit_message>
<xml_diff>
--- a/Documentation/Critique/Critique.pptx
+++ b/Documentation/Critique/Critique.pptx
@@ -10,7 +10,7 @@
   <p:sldIdLst>
     <p:sldId id="256" r:id="rId2"/>
     <p:sldId id="257" r:id="rId3"/>
-    <p:sldId id="258" r:id="rId4"/>
+    <p:sldId id="264" r:id="rId4"/>
     <p:sldId id="259" r:id="rId5"/>
     <p:sldId id="262" r:id="rId6"/>
     <p:sldId id="260" r:id="rId7"/>
@@ -317,6 +317,22 @@
       </a:defRPr>
     </a:lvl9pPr>
   </p:defaultTextStyle>
+  <p:extLst>
+    <p:ext uri="{EFAFB233-063F-42B5-8137-9DF3F51BA10A}">
+      <p15:sldGuideLst xmlns:p15="http://schemas.microsoft.com/office/powerpoint/2012/main">
+        <p15:guide id="1" orient="horz" pos="2160">
+          <p15:clr>
+            <a:srgbClr val="A4A3A4"/>
+          </p15:clr>
+        </p15:guide>
+        <p15:guide id="2" pos="3840">
+          <p15:clr>
+            <a:srgbClr val="A4A3A4"/>
+          </p15:clr>
+        </p15:guide>
+      </p15:sldGuideLst>
+    </p:ext>
+  </p:extLst>
 </p:presentation>
 </file>
 
@@ -5623,11 +5639,14 @@
               <a:defRPr b="1"/>
             </a:pPr>
             <a:r>
+              <a:rPr dirty="0"/>
               <a:t>Is It Worth Responding to Reviews?</a:t>
             </a:r>
-            <a:br/>
-            <a:r>
-              <a:rPr sz="2400"/>
+            <a:br>
+              <a:rPr dirty="0"/>
+            </a:br>
+            <a:r>
+              <a:rPr sz="2400" dirty="0"/>
               <a:t>Studying the Top Free Apps in Google Play</a:t>
             </a:r>
           </a:p>
@@ -5664,6 +5683,7 @@
               </a:defRPr>
             </a:pPr>
             <a:r>
+              <a:rPr dirty="0"/>
               <a:t>Critique by : Team 11</a:t>
             </a:r>
           </a:p>
@@ -5676,6 +5696,7 @@
               </a:defRPr>
             </a:pPr>
             <a:r>
+              <a:rPr dirty="0"/>
               <a:t>Ruthvic Punyamurtula – 30</a:t>
             </a:r>
           </a:p>
@@ -5688,7 +5709,16 @@
               </a:defRPr>
             </a:pPr>
             <a:r>
-              <a:t>Cameron L’Ecuyer – 17</a:t>
+              <a:rPr dirty="0"/>
+              <a:t>Cameron </a:t>
+            </a:r>
+            <a:r>
+              <a:rPr dirty="0" err="1"/>
+              <a:t>L’Ecuyer</a:t>
+            </a:r>
+            <a:r>
+              <a:rPr dirty="0"/>
+              <a:t> – 17</a:t>
             </a:r>
           </a:p>
           <a:p>
@@ -5700,6 +5730,7 @@
               </a:defRPr>
             </a:pPr>
             <a:r>
+              <a:rPr dirty="0"/>
               <a:t>Sneha Mishra – 21</a:t>
             </a:r>
           </a:p>
@@ -5712,11 +5743,46 @@
               </a:defRPr>
             </a:pPr>
             <a:r>
-              <a:t>Navya Ramya Sirisha - 26</a:t>
+              <a:rPr dirty="0" err="1"/>
+              <a:t>Navya</a:t>
+            </a:r>
+            <a:r>
+              <a:rPr dirty="0"/>
+              <a:t> Ramya Sirisha - 26</a:t>
             </a:r>
           </a:p>
         </p:txBody>
       </p:sp>
+      <p:pic>
+        <p:nvPicPr>
+          <p:cNvPr id="2" name="Picture 1">
+            <a:extLst>
+              <a:ext uri="{FF2B5EF4-FFF2-40B4-BE49-F238E27FC236}">
+                <a16:creationId xmlns:a16="http://schemas.microsoft.com/office/drawing/2014/main" id="{491A6588-8D0D-4804-9D8E-E44566312F80}"/>
+              </a:ext>
+            </a:extLst>
+          </p:cNvPr>
+          <p:cNvPicPr>
+            <a:picLocks noChangeAspect="1"/>
+          </p:cNvPicPr>
+          <p:nvPr/>
+        </p:nvPicPr>
+        <p:blipFill>
+          <a:blip r:embed="rId2"/>
+          <a:stretch>
+            <a:fillRect/>
+          </a:stretch>
+        </p:blipFill>
+        <p:spPr>
+          <a:xfrm>
+            <a:off x="4295160" y="2209800"/>
+            <a:ext cx="2190750" cy="507183"/>
+          </a:xfrm>
+          <a:prstGeom prst="rect">
+            <a:avLst/>
+          </a:prstGeom>
+        </p:spPr>
+      </p:pic>
     </p:spTree>
   </p:cSld>
   <p:clrMapOvr>
@@ -5767,7 +5833,7 @@
           <a:lstStyle/>
           <a:p>
             <a:r>
-              <a:rPr lang="en-US" dirty="0" smtClean="0"/>
+              <a:rPr lang="en-US" dirty="0"/>
               <a:t>Summary</a:t>
             </a:r>
             <a:endParaRPr dirty="0"/>
@@ -5786,18 +5852,534 @@
         </p:nvSpPr>
         <p:spPr>
           <a:xfrm>
-            <a:off x="677333" y="2160589"/>
-            <a:ext cx="8596670" cy="3880773"/>
+            <a:off x="609600" y="1676401"/>
+            <a:ext cx="8664403" cy="4364962"/>
           </a:xfrm>
           <a:prstGeom prst="rect">
             <a:avLst/>
           </a:prstGeom>
         </p:spPr>
         <p:txBody>
-          <a:bodyPr/>
+          <a:bodyPr>
+            <a:normAutofit lnSpcReduction="10000"/>
+          </a:bodyPr>
           <a:lstStyle/>
           <a:p>
-            <a:endParaRPr/>
+            <a:r>
+              <a:rPr lang="en-US" dirty="0"/>
+              <a:t>Process of users reviewing the apps and developers responding to the reviews</a:t>
+            </a:r>
+          </a:p>
+          <a:p>
+            <a:r>
+              <a:rPr lang="en-US" dirty="0"/>
+              <a:t>Data : Tops apps (12000) in 30 categories, from Google play Store</a:t>
+            </a:r>
+          </a:p>
+          <a:p>
+            <a:r>
+              <a:rPr lang="en-US" dirty="0"/>
+              <a:t>Reason : Users                   Reviews                    Developer’s Profit </a:t>
+            </a:r>
+          </a:p>
+          <a:p>
+            <a:r>
+              <a:rPr lang="en-US" dirty="0"/>
+              <a:t>Criteria : A year before apps, as they tend to be stable</a:t>
+            </a:r>
+          </a:p>
+          <a:p>
+            <a:r>
+              <a:rPr lang="en-US" dirty="0"/>
+              <a:t>Collection : Web crawler extracts app names, ratings and comments</a:t>
+            </a:r>
+          </a:p>
+          <a:p>
+            <a:r>
+              <a:rPr lang="en-US" dirty="0"/>
+              <a:t>The crawler ran from 1 January to 2 March 2014 and during that time 10,713 apps data was collected</a:t>
+            </a:r>
+          </a:p>
+          <a:p>
+            <a:r>
+              <a:rPr lang="en-US" dirty="0"/>
+              <a:t>Limitation : only 500 latest reviews per app are accessible and could be collected by crawler</a:t>
+            </a:r>
+          </a:p>
+          <a:p>
+            <a:r>
+              <a:rPr lang="en-US" dirty="0"/>
+              <a:t>Manual analysis : Time consuming and iterative – grouping reviews</a:t>
+            </a:r>
+          </a:p>
+          <a:p>
+            <a:r>
+              <a:rPr lang="en-US" dirty="0"/>
+              <a:t>Automated analysis : Phase 1  - separated reviews into 25 groups, Phase 2 – observed the responses and rating changes</a:t>
+            </a:r>
+          </a:p>
+        </p:txBody>
+      </p:sp>
+      <p:sp>
+        <p:nvSpPr>
+          <p:cNvPr id="3" name="Arrow: Down 2">
+            <a:extLst>
+              <a:ext uri="{FF2B5EF4-FFF2-40B4-BE49-F238E27FC236}">
+                <a16:creationId xmlns:a16="http://schemas.microsoft.com/office/drawing/2014/main" id="{E6080A5F-A632-4F75-BE02-7E9F01A79734}"/>
+              </a:ext>
+            </a:extLst>
+          </p:cNvPr>
+          <p:cNvSpPr/>
+          <p:nvPr/>
+        </p:nvSpPr>
+        <p:spPr>
+          <a:xfrm rot="10800000">
+            <a:off x="2643014" y="2514600"/>
+            <a:ext cx="304800" cy="228600"/>
+          </a:xfrm>
+          <a:prstGeom prst="downArrow">
+            <a:avLst/>
+          </a:prstGeom>
+          <a:solidFill>
+            <a:schemeClr val="accent1">
+              <a:lumMod val="60000"/>
+              <a:lumOff val="40000"/>
+            </a:schemeClr>
+          </a:solidFill>
+          <a:ln w="19050" cap="rnd">
+            <a:solidFill>
+              <a:schemeClr val="accent1"/>
+            </a:solidFill>
+            <a:prstDash val="solid"/>
+            <a:round/>
+          </a:ln>
+          <a:effectLst>
+            <a:outerShdw blurRad="38100" dist="25400" dir="5400000" rotWithShape="0">
+              <a:srgbClr val="000000">
+                <a:alpha val="35000"/>
+              </a:srgbClr>
+            </a:outerShdw>
+          </a:effectLst>
+          <a:sp3d/>
+        </p:spPr>
+        <p:style>
+          <a:lnRef idx="0">
+            <a:scrgbClr r="0" g="0" b="0"/>
+          </a:lnRef>
+          <a:fillRef idx="0">
+            <a:scrgbClr r="0" g="0" b="0"/>
+          </a:fillRef>
+          <a:effectRef idx="0">
+            <a:scrgbClr r="0" g="0" b="0"/>
+          </a:effectRef>
+          <a:fontRef idx="none"/>
+        </p:style>
+        <p:txBody>
+          <a:bodyPr rot="0" spcFirstLastPara="1" vertOverflow="overflow" horzOverflow="overflow" vert="horz" wrap="square" lIns="45719" tIns="45719" rIns="45719" bIns="45719" numCol="1" spcCol="38100" rtlCol="0" anchor="ctr">
+            <a:spAutoFit/>
+          </a:bodyPr>
+          <a:lstStyle/>
+          <a:p>
+            <a:pPr marL="0" marR="0" indent="0" algn="l" defTabSz="457200" rtl="0" fontAlgn="auto" latinLnBrk="0" hangingPunct="0">
+              <a:lnSpc>
+                <a:spcPct val="100000"/>
+              </a:lnSpc>
+              <a:spcBef>
+                <a:spcPts val="0"/>
+              </a:spcBef>
+              <a:spcAft>
+                <a:spcPts val="0"/>
+              </a:spcAft>
+              <a:buClrTx/>
+              <a:buSzTx/>
+              <a:buFontTx/>
+              <a:buNone/>
+              <a:tabLst/>
+            </a:pPr>
+            <a:endParaRPr kumimoji="0" lang="en-US" sz="1800" b="0" i="0" u="none" strike="noStrike" cap="none" spc="0" normalizeH="0" baseline="0">
+              <a:ln>
+                <a:noFill/>
+              </a:ln>
+              <a:solidFill>
+                <a:srgbClr val="000000"/>
+              </a:solidFill>
+              <a:effectLst/>
+              <a:uFillTx/>
+              <a:latin typeface="+mn-lt"/>
+              <a:ea typeface="+mn-ea"/>
+              <a:cs typeface="+mn-cs"/>
+              <a:sym typeface="Trebuchet MS"/>
+            </a:endParaRPr>
+          </a:p>
+        </p:txBody>
+      </p:sp>
+      <p:sp>
+        <p:nvSpPr>
+          <p:cNvPr id="4" name="Plus Sign 3">
+            <a:extLst>
+              <a:ext uri="{FF2B5EF4-FFF2-40B4-BE49-F238E27FC236}">
+                <a16:creationId xmlns:a16="http://schemas.microsoft.com/office/drawing/2014/main" id="{24C34136-1767-4309-A68E-F637D03DA7F1}"/>
+              </a:ext>
+            </a:extLst>
+          </p:cNvPr>
+          <p:cNvSpPr/>
+          <p:nvPr/>
+        </p:nvSpPr>
+        <p:spPr>
+          <a:xfrm>
+            <a:off x="3200400" y="2450824"/>
+            <a:ext cx="381000" cy="356151"/>
+          </a:xfrm>
+          <a:prstGeom prst="mathPlus">
+            <a:avLst/>
+          </a:prstGeom>
+          <a:solidFill>
+            <a:schemeClr val="accent5">
+              <a:lumMod val="75000"/>
+            </a:schemeClr>
+          </a:solidFill>
+          <a:ln w="19050" cap="rnd">
+            <a:solidFill>
+              <a:schemeClr val="accent5">
+                <a:lumMod val="75000"/>
+              </a:schemeClr>
+            </a:solidFill>
+            <a:prstDash val="solid"/>
+            <a:round/>
+          </a:ln>
+          <a:effectLst>
+            <a:outerShdw blurRad="38100" dist="25400" dir="5400000" rotWithShape="0">
+              <a:srgbClr val="000000">
+                <a:alpha val="35000"/>
+              </a:srgbClr>
+            </a:outerShdw>
+          </a:effectLst>
+          <a:sp3d/>
+        </p:spPr>
+        <p:style>
+          <a:lnRef idx="0">
+            <a:scrgbClr r="0" g="0" b="0"/>
+          </a:lnRef>
+          <a:fillRef idx="0">
+            <a:scrgbClr r="0" g="0" b="0"/>
+          </a:fillRef>
+          <a:effectRef idx="0">
+            <a:scrgbClr r="0" g="0" b="0"/>
+          </a:effectRef>
+          <a:fontRef idx="none"/>
+        </p:style>
+        <p:txBody>
+          <a:bodyPr rot="0" spcFirstLastPara="1" vertOverflow="overflow" horzOverflow="overflow" vert="horz" wrap="square" lIns="45719" tIns="45719" rIns="45719" bIns="45719" numCol="1" spcCol="38100" rtlCol="0" anchor="ctr">
+            <a:spAutoFit/>
+          </a:bodyPr>
+          <a:lstStyle/>
+          <a:p>
+            <a:pPr marL="0" marR="0" indent="0" algn="l" defTabSz="457200" rtl="0" fontAlgn="auto" latinLnBrk="0" hangingPunct="0">
+              <a:lnSpc>
+                <a:spcPct val="100000"/>
+              </a:lnSpc>
+              <a:spcBef>
+                <a:spcPts val="0"/>
+              </a:spcBef>
+              <a:spcAft>
+                <a:spcPts val="0"/>
+              </a:spcAft>
+              <a:buClrTx/>
+              <a:buSzTx/>
+              <a:buFontTx/>
+              <a:buNone/>
+              <a:tabLst/>
+            </a:pPr>
+            <a:endParaRPr kumimoji="0" lang="en-US" sz="1800" b="0" i="0" u="none" strike="noStrike" cap="none" spc="0" normalizeH="0" baseline="0" dirty="0">
+              <a:ln>
+                <a:noFill/>
+              </a:ln>
+              <a:solidFill>
+                <a:srgbClr val="000000"/>
+              </a:solidFill>
+              <a:effectLst/>
+              <a:uFillTx/>
+              <a:latin typeface="+mn-lt"/>
+              <a:ea typeface="+mn-ea"/>
+              <a:cs typeface="+mn-cs"/>
+              <a:sym typeface="Trebuchet MS"/>
+            </a:endParaRPr>
+          </a:p>
+        </p:txBody>
+      </p:sp>
+      <p:sp>
+        <p:nvSpPr>
+          <p:cNvPr id="7" name="Arrow: Down 6">
+            <a:extLst>
+              <a:ext uri="{FF2B5EF4-FFF2-40B4-BE49-F238E27FC236}">
+                <a16:creationId xmlns:a16="http://schemas.microsoft.com/office/drawing/2014/main" id="{30377D12-1BA1-4875-B78B-8C5EB1093A1F}"/>
+              </a:ext>
+            </a:extLst>
+          </p:cNvPr>
+          <p:cNvSpPr/>
+          <p:nvPr/>
+        </p:nvSpPr>
+        <p:spPr>
+          <a:xfrm rot="10800000">
+            <a:off x="4670868" y="2482296"/>
+            <a:ext cx="304800" cy="293205"/>
+          </a:xfrm>
+          <a:prstGeom prst="downArrow">
+            <a:avLst/>
+          </a:prstGeom>
+          <a:solidFill>
+            <a:schemeClr val="accent1">
+              <a:lumMod val="60000"/>
+              <a:lumOff val="40000"/>
+            </a:schemeClr>
+          </a:solidFill>
+          <a:ln w="19050" cap="rnd">
+            <a:solidFill>
+              <a:schemeClr val="accent1"/>
+            </a:solidFill>
+            <a:prstDash val="solid"/>
+            <a:round/>
+          </a:ln>
+          <a:effectLst>
+            <a:outerShdw blurRad="38100" dist="25400" dir="5400000" rotWithShape="0">
+              <a:srgbClr val="000000">
+                <a:alpha val="35000"/>
+              </a:srgbClr>
+            </a:outerShdw>
+          </a:effectLst>
+          <a:sp3d/>
+        </p:spPr>
+        <p:style>
+          <a:lnRef idx="0">
+            <a:scrgbClr r="0" g="0" b="0"/>
+          </a:lnRef>
+          <a:fillRef idx="0">
+            <a:scrgbClr r="0" g="0" b="0"/>
+          </a:fillRef>
+          <a:effectRef idx="0">
+            <a:scrgbClr r="0" g="0" b="0"/>
+          </a:effectRef>
+          <a:fontRef idx="none"/>
+        </p:style>
+        <p:txBody>
+          <a:bodyPr rot="0" spcFirstLastPara="1" vertOverflow="overflow" horzOverflow="overflow" vert="horz" wrap="square" lIns="45719" tIns="45719" rIns="45719" bIns="45719" numCol="1" spcCol="38100" rtlCol="0" anchor="ctr">
+            <a:spAutoFit/>
+          </a:bodyPr>
+          <a:lstStyle/>
+          <a:p>
+            <a:pPr marL="0" marR="0" indent="0" algn="l" defTabSz="457200" rtl="0" fontAlgn="auto" latinLnBrk="0" hangingPunct="0">
+              <a:lnSpc>
+                <a:spcPct val="100000"/>
+              </a:lnSpc>
+              <a:spcBef>
+                <a:spcPts val="0"/>
+              </a:spcBef>
+              <a:spcAft>
+                <a:spcPts val="0"/>
+              </a:spcAft>
+              <a:buClrTx/>
+              <a:buSzTx/>
+              <a:buFontTx/>
+              <a:buNone/>
+              <a:tabLst/>
+            </a:pPr>
+            <a:endParaRPr kumimoji="0" lang="en-US" sz="1800" b="0" i="0" u="none" strike="noStrike" cap="none" spc="0" normalizeH="0" baseline="0">
+              <a:ln>
+                <a:noFill/>
+              </a:ln>
+              <a:solidFill>
+                <a:srgbClr val="000000"/>
+              </a:solidFill>
+              <a:effectLst/>
+              <a:uFillTx/>
+              <a:latin typeface="+mn-lt"/>
+              <a:ea typeface="+mn-ea"/>
+              <a:cs typeface="+mn-cs"/>
+              <a:sym typeface="Trebuchet MS"/>
+            </a:endParaRPr>
+          </a:p>
+        </p:txBody>
+      </p:sp>
+      <p:sp>
+        <p:nvSpPr>
+          <p:cNvPr id="5" name="Equals 4">
+            <a:extLst>
+              <a:ext uri="{FF2B5EF4-FFF2-40B4-BE49-F238E27FC236}">
+                <a16:creationId xmlns:a16="http://schemas.microsoft.com/office/drawing/2014/main" id="{DC55CA16-2845-4B73-B3A1-B0CB32A6C9D0}"/>
+              </a:ext>
+            </a:extLst>
+          </p:cNvPr>
+          <p:cNvSpPr/>
+          <p:nvPr/>
+        </p:nvSpPr>
+        <p:spPr>
+          <a:xfrm>
+            <a:off x="5197167" y="2514600"/>
+            <a:ext cx="533400" cy="299828"/>
+          </a:xfrm>
+          <a:prstGeom prst="mathEqual">
+            <a:avLst/>
+          </a:prstGeom>
+          <a:solidFill>
+            <a:srgbClr val="0070C0"/>
+          </a:solidFill>
+          <a:ln w="19050" cap="rnd">
+            <a:solidFill>
+              <a:schemeClr val="bg1"/>
+            </a:solidFill>
+            <a:prstDash val="solid"/>
+            <a:round/>
+          </a:ln>
+          <a:effectLst>
+            <a:outerShdw blurRad="38100" dist="25400" dir="5400000" rotWithShape="0">
+              <a:srgbClr val="000000">
+                <a:alpha val="35000"/>
+              </a:srgbClr>
+            </a:outerShdw>
+          </a:effectLst>
+          <a:sp3d/>
+        </p:spPr>
+        <p:style>
+          <a:lnRef idx="0">
+            <a:scrgbClr r="0" g="0" b="0"/>
+          </a:lnRef>
+          <a:fillRef idx="0">
+            <a:scrgbClr r="0" g="0" b="0"/>
+          </a:fillRef>
+          <a:effectRef idx="0">
+            <a:scrgbClr r="0" g="0" b="0"/>
+          </a:effectRef>
+          <a:fontRef idx="none"/>
+        </p:style>
+        <p:txBody>
+          <a:bodyPr rot="0" spcFirstLastPara="1" vertOverflow="overflow" horzOverflow="overflow" vert="horz" wrap="square" lIns="45719" tIns="45719" rIns="45719" bIns="45719" numCol="1" spcCol="38100" rtlCol="0" anchor="ctr">
+            <a:spAutoFit/>
+          </a:bodyPr>
+          <a:lstStyle/>
+          <a:p>
+            <a:pPr marL="0" marR="0" indent="0" algn="l" defTabSz="457200" rtl="0" fontAlgn="auto" latinLnBrk="0" hangingPunct="0">
+              <a:lnSpc>
+                <a:spcPct val="100000"/>
+              </a:lnSpc>
+              <a:spcBef>
+                <a:spcPts val="0"/>
+              </a:spcBef>
+              <a:spcAft>
+                <a:spcPts val="0"/>
+              </a:spcAft>
+              <a:buClrTx/>
+              <a:buSzTx/>
+              <a:buFontTx/>
+              <a:buNone/>
+              <a:tabLst/>
+            </a:pPr>
+            <a:endParaRPr kumimoji="0" lang="en-US" sz="1800" b="0" i="0" u="none" strike="noStrike" cap="none" spc="0" normalizeH="0" baseline="0">
+              <a:ln>
+                <a:noFill/>
+              </a:ln>
+              <a:solidFill>
+                <a:srgbClr val="000000"/>
+              </a:solidFill>
+              <a:effectLst/>
+              <a:uFillTx/>
+              <a:latin typeface="+mn-lt"/>
+              <a:ea typeface="+mn-ea"/>
+              <a:cs typeface="+mn-cs"/>
+              <a:sym typeface="Trebuchet MS"/>
+            </a:endParaRPr>
+          </a:p>
+        </p:txBody>
+      </p:sp>
+      <p:sp>
+        <p:nvSpPr>
+          <p:cNvPr id="9" name="Arrow: Down 8">
+            <a:extLst>
+              <a:ext uri="{FF2B5EF4-FFF2-40B4-BE49-F238E27FC236}">
+                <a16:creationId xmlns:a16="http://schemas.microsoft.com/office/drawing/2014/main" id="{3AE46495-65C3-416B-9431-6A35E53328ED}"/>
+              </a:ext>
+            </a:extLst>
+          </p:cNvPr>
+          <p:cNvSpPr/>
+          <p:nvPr/>
+        </p:nvSpPr>
+        <p:spPr>
+          <a:xfrm rot="10800000">
+            <a:off x="8016567" y="2482296"/>
+            <a:ext cx="304800" cy="293205"/>
+          </a:xfrm>
+          <a:prstGeom prst="downArrow">
+            <a:avLst/>
+          </a:prstGeom>
+          <a:solidFill>
+            <a:schemeClr val="accent1">
+              <a:lumMod val="60000"/>
+              <a:lumOff val="40000"/>
+            </a:schemeClr>
+          </a:solidFill>
+          <a:ln w="19050" cap="rnd">
+            <a:solidFill>
+              <a:schemeClr val="accent1"/>
+            </a:solidFill>
+            <a:prstDash val="solid"/>
+            <a:round/>
+          </a:ln>
+          <a:effectLst>
+            <a:outerShdw blurRad="38100" dist="25400" dir="5400000" rotWithShape="0">
+              <a:srgbClr val="000000">
+                <a:alpha val="35000"/>
+              </a:srgbClr>
+            </a:outerShdw>
+          </a:effectLst>
+          <a:sp3d/>
+        </p:spPr>
+        <p:style>
+          <a:lnRef idx="0">
+            <a:scrgbClr r="0" g="0" b="0"/>
+          </a:lnRef>
+          <a:fillRef idx="0">
+            <a:scrgbClr r="0" g="0" b="0"/>
+          </a:fillRef>
+          <a:effectRef idx="0">
+            <a:scrgbClr r="0" g="0" b="0"/>
+          </a:effectRef>
+          <a:fontRef idx="none"/>
+        </p:style>
+        <p:txBody>
+          <a:bodyPr rot="0" spcFirstLastPara="1" vertOverflow="overflow" horzOverflow="overflow" vert="horz" wrap="square" lIns="45719" tIns="45719" rIns="45719" bIns="45719" numCol="1" spcCol="38100" rtlCol="0" anchor="ctr">
+            <a:spAutoFit/>
+          </a:bodyPr>
+          <a:lstStyle/>
+          <a:p>
+            <a:pPr marL="0" marR="0" indent="0" algn="l" defTabSz="457200" rtl="0" fontAlgn="auto" latinLnBrk="0" hangingPunct="0">
+              <a:lnSpc>
+                <a:spcPct val="100000"/>
+              </a:lnSpc>
+              <a:spcBef>
+                <a:spcPts val="0"/>
+              </a:spcBef>
+              <a:spcAft>
+                <a:spcPts val="0"/>
+              </a:spcAft>
+              <a:buClrTx/>
+              <a:buSzTx/>
+              <a:buFontTx/>
+              <a:buNone/>
+              <a:tabLst/>
+            </a:pPr>
+            <a:endParaRPr kumimoji="0" lang="en-US" sz="1800" b="0" i="0" u="none" strike="noStrike" cap="none" spc="0" normalizeH="0" baseline="0" dirty="0">
+              <a:ln>
+                <a:noFill/>
+              </a:ln>
+              <a:solidFill>
+                <a:srgbClr val="000000"/>
+              </a:solidFill>
+              <a:effectLst/>
+              <a:uFillTx/>
+              <a:latin typeface="+mn-lt"/>
+              <a:ea typeface="+mn-ea"/>
+              <a:cs typeface="+mn-cs"/>
+              <a:sym typeface="Trebuchet MS"/>
+            </a:endParaRPr>
           </a:p>
         </p:txBody>
       </p:sp>
@@ -5829,8 +6411,14 @@
       </p:grpSpPr>
       <p:sp>
         <p:nvSpPr>
-          <p:cNvPr id="192" name="Title 1"/>
-          <p:cNvSpPr txBox="1">
+          <p:cNvPr id="2" name="Title 1">
+            <a:extLst>
+              <a:ext uri="{FF2B5EF4-FFF2-40B4-BE49-F238E27FC236}">
+                <a16:creationId xmlns:a16="http://schemas.microsoft.com/office/drawing/2014/main" id="{10277F60-7ADF-44AE-B654-D6480A5A30A7}"/>
+              </a:ext>
+            </a:extLst>
+          </p:cNvPr>
+          <p:cNvSpPr>
             <a:spLocks noGrp="1"/>
           </p:cNvSpPr>
           <p:nvPr>
@@ -5839,29 +6427,61 @@
         </p:nvSpPr>
         <p:spPr>
           <a:xfrm>
-            <a:off x="677333" y="609600"/>
-            <a:ext cx="8596670" cy="1320800"/>
+            <a:off x="677333" y="353461"/>
+            <a:ext cx="8596670" cy="685800"/>
+          </a:xfrm>
+        </p:spPr>
+        <p:txBody>
+          <a:bodyPr/>
+          <a:lstStyle/>
+          <a:p>
+            <a:r>
+              <a:rPr lang="en-US" dirty="0"/>
+              <a:t>Results</a:t>
+            </a:r>
+          </a:p>
+        </p:txBody>
+      </p:sp>
+      <p:pic>
+        <p:nvPicPr>
+          <p:cNvPr id="4" name="Picture 3">
+            <a:extLst>
+              <a:ext uri="{FF2B5EF4-FFF2-40B4-BE49-F238E27FC236}">
+                <a16:creationId xmlns:a16="http://schemas.microsoft.com/office/drawing/2014/main" id="{524D8138-8E89-49BE-9F93-233D08AAA0CA}"/>
+              </a:ext>
+            </a:extLst>
+          </p:cNvPr>
+          <p:cNvPicPr>
+            <a:picLocks noChangeAspect="1"/>
+          </p:cNvPicPr>
+          <p:nvPr/>
+        </p:nvPicPr>
+        <p:blipFill>
+          <a:blip r:embed="rId2"/>
+          <a:stretch>
+            <a:fillRect/>
+          </a:stretch>
+        </p:blipFill>
+        <p:spPr>
+          <a:xfrm>
+            <a:off x="5486398" y="1061417"/>
+            <a:ext cx="4114802" cy="2597101"/>
           </a:xfrm>
           <a:prstGeom prst="rect">
             <a:avLst/>
           </a:prstGeom>
         </p:spPr>
-        <p:txBody>
-          <a:bodyPr/>
-          <a:lstStyle/>
-          <a:p>
-            <a:r>
-              <a:rPr lang="en-US" dirty="0" smtClean="0"/>
-              <a:t>Positive Aspects</a:t>
-            </a:r>
-            <a:endParaRPr dirty="0"/>
-          </a:p>
-        </p:txBody>
-      </p:sp>
+      </p:pic>
       <p:sp>
         <p:nvSpPr>
-          <p:cNvPr id="193" name="Content Placeholder 2"/>
-          <p:cNvSpPr txBox="1">
+          <p:cNvPr id="3" name="Text Placeholder 2">
+            <a:extLst>
+              <a:ext uri="{FF2B5EF4-FFF2-40B4-BE49-F238E27FC236}">
+                <a16:creationId xmlns:a16="http://schemas.microsoft.com/office/drawing/2014/main" id="{113CDCB8-8434-43A8-BD15-E61E1EB51D3F}"/>
+              </a:ext>
+            </a:extLst>
+          </p:cNvPr>
+          <p:cNvSpPr>
             <a:spLocks noGrp="1"/>
           </p:cNvSpPr>
           <p:nvPr>
@@ -5870,22 +6490,1014 @@
         </p:nvSpPr>
         <p:spPr>
           <a:xfrm>
-            <a:off x="677333" y="2160589"/>
-            <a:ext cx="8596670" cy="3880773"/>
+            <a:off x="677333" y="1020418"/>
+            <a:ext cx="8596670" cy="2438399"/>
+          </a:xfrm>
+        </p:spPr>
+        <p:txBody>
+          <a:bodyPr/>
+          <a:lstStyle/>
+          <a:p>
+            <a:r>
+              <a:rPr lang="en-US" dirty="0"/>
+              <a:t>Developers of only 13.8% of the 10,713      		                                          apps responded</a:t>
+            </a:r>
+          </a:p>
+          <a:p>
+            <a:r>
+              <a:rPr lang="en-US" dirty="0"/>
+              <a:t>Found that 38.7% of users increased their								 rating after a response</a:t>
+            </a:r>
+          </a:p>
+          <a:p>
+            <a:r>
+              <a:rPr lang="en-US" dirty="0"/>
+              <a:t>Median increase was one star (20 percent)</a:t>
+            </a:r>
+          </a:p>
+          <a:p>
+            <a:r>
+              <a:rPr lang="en-US" dirty="0"/>
+              <a:t>Avg rating for the apps whose developers									 did not respond was only 1.7 stars</a:t>
+            </a:r>
+          </a:p>
+          <a:p>
+            <a:pPr marL="0" indent="0">
+              <a:buNone/>
+            </a:pPr>
+            <a:endParaRPr lang="en-US" dirty="0"/>
+          </a:p>
+          <a:p>
+            <a:endParaRPr lang="en-US" dirty="0"/>
+          </a:p>
+          <a:p>
+            <a:endParaRPr lang="en-US" dirty="0"/>
+          </a:p>
+        </p:txBody>
+      </p:sp>
+      <p:sp>
+        <p:nvSpPr>
+          <p:cNvPr id="5" name="Oval 4">
+            <a:extLst>
+              <a:ext uri="{FF2B5EF4-FFF2-40B4-BE49-F238E27FC236}">
+                <a16:creationId xmlns:a16="http://schemas.microsoft.com/office/drawing/2014/main" id="{2EB75B4D-A6B6-45F7-AEBB-7E3514650F4A}"/>
+              </a:ext>
+            </a:extLst>
+          </p:cNvPr>
+          <p:cNvSpPr/>
+          <p:nvPr/>
+        </p:nvSpPr>
+        <p:spPr>
+          <a:xfrm>
+            <a:off x="7603294" y="2606330"/>
+            <a:ext cx="1019769" cy="609600"/>
+          </a:xfrm>
+          <a:prstGeom prst="ellipse">
+            <a:avLst/>
+          </a:prstGeom>
+          <a:solidFill>
+            <a:schemeClr val="bg1"/>
+          </a:solidFill>
+          <a:ln w="19050" cap="rnd">
+            <a:solidFill>
+              <a:srgbClr val="00B0F0"/>
+            </a:solidFill>
+            <a:prstDash val="solid"/>
+            <a:round/>
+          </a:ln>
+          <a:effectLst/>
+          <a:scene3d>
+            <a:camera prst="orthographicFront">
+              <a:rot lat="0" lon="0" rev="0"/>
+            </a:camera>
+            <a:lightRig rig="chilly" dir="t">
+              <a:rot lat="0" lon="0" rev="18480000"/>
+            </a:lightRig>
+          </a:scene3d>
+          <a:sp3d prstMaterial="clear">
+            <a:bevelT h="63500"/>
+          </a:sp3d>
+        </p:spPr>
+        <p:style>
+          <a:lnRef idx="0">
+            <a:scrgbClr r="0" g="0" b="0"/>
+          </a:lnRef>
+          <a:fillRef idx="0">
+            <a:scrgbClr r="0" g="0" b="0"/>
+          </a:fillRef>
+          <a:effectRef idx="0">
+            <a:scrgbClr r="0" g="0" b="0"/>
+          </a:effectRef>
+          <a:fontRef idx="none"/>
+        </p:style>
+        <p:txBody>
+          <a:bodyPr rot="0" spcFirstLastPara="1" vertOverflow="overflow" horzOverflow="overflow" vert="horz" wrap="square" lIns="45719" tIns="45719" rIns="45719" bIns="45719" numCol="1" spcCol="38100" rtlCol="0" anchor="ctr">
+            <a:spAutoFit/>
+          </a:bodyPr>
+          <a:lstStyle/>
+          <a:p>
+            <a:pPr marL="0" marR="0" indent="0" algn="l" defTabSz="457200" rtl="0" fontAlgn="auto" latinLnBrk="0" hangingPunct="0">
+              <a:lnSpc>
+                <a:spcPct val="100000"/>
+              </a:lnSpc>
+              <a:spcBef>
+                <a:spcPts val="0"/>
+              </a:spcBef>
+              <a:spcAft>
+                <a:spcPts val="0"/>
+              </a:spcAft>
+              <a:buClrTx/>
+              <a:buSzTx/>
+              <a:buFontTx/>
+              <a:buNone/>
+              <a:tabLst/>
+            </a:pPr>
+            <a:endParaRPr kumimoji="0" lang="en-US" sz="1800" b="0" i="0" u="none" strike="noStrike" cap="none" spc="0" normalizeH="0" baseline="0">
+              <a:ln>
+                <a:noFill/>
+              </a:ln>
+              <a:solidFill>
+                <a:srgbClr val="000000"/>
+              </a:solidFill>
+              <a:effectLst/>
+              <a:uFillTx/>
+              <a:latin typeface="+mn-lt"/>
+              <a:ea typeface="+mn-ea"/>
+              <a:cs typeface="+mn-cs"/>
+              <a:sym typeface="Trebuchet MS"/>
+            </a:endParaRPr>
+          </a:p>
+        </p:txBody>
+      </p:sp>
+      <p:sp>
+        <p:nvSpPr>
+          <p:cNvPr id="7" name="Oval 6">
+            <a:extLst>
+              <a:ext uri="{FF2B5EF4-FFF2-40B4-BE49-F238E27FC236}">
+                <a16:creationId xmlns:a16="http://schemas.microsoft.com/office/drawing/2014/main" id="{4B36515A-DD97-4C92-B8F8-27724CC9D731}"/>
+              </a:ext>
+            </a:extLst>
+          </p:cNvPr>
+          <p:cNvSpPr/>
+          <p:nvPr/>
+        </p:nvSpPr>
+        <p:spPr>
+          <a:xfrm>
+            <a:off x="6964525" y="2563830"/>
+            <a:ext cx="638769" cy="457200"/>
+          </a:xfrm>
+          <a:prstGeom prst="ellipse">
+            <a:avLst/>
+          </a:prstGeom>
+          <a:solidFill>
+            <a:schemeClr val="bg1"/>
+          </a:solidFill>
+          <a:ln w="19050" cap="rnd">
+            <a:solidFill>
+              <a:srgbClr val="FFFF00"/>
+            </a:solidFill>
+            <a:prstDash val="solid"/>
+            <a:round/>
+          </a:ln>
+          <a:effectLst/>
+          <a:scene3d>
+            <a:camera prst="orthographicFront">
+              <a:rot lat="0" lon="0" rev="0"/>
+            </a:camera>
+            <a:lightRig rig="chilly" dir="t">
+              <a:rot lat="0" lon="0" rev="18480000"/>
+            </a:lightRig>
+          </a:scene3d>
+          <a:sp3d prstMaterial="clear">
+            <a:bevelT h="63500"/>
+          </a:sp3d>
+        </p:spPr>
+        <p:style>
+          <a:lnRef idx="0">
+            <a:scrgbClr r="0" g="0" b="0"/>
+          </a:lnRef>
+          <a:fillRef idx="0">
+            <a:scrgbClr r="0" g="0" b="0"/>
+          </a:fillRef>
+          <a:effectRef idx="0">
+            <a:scrgbClr r="0" g="0" b="0"/>
+          </a:effectRef>
+          <a:fontRef idx="none"/>
+        </p:style>
+        <p:txBody>
+          <a:bodyPr rot="0" spcFirstLastPara="1" vertOverflow="overflow" horzOverflow="overflow" vert="horz" wrap="square" lIns="45719" tIns="45719" rIns="45719" bIns="45719" numCol="1" spcCol="38100" rtlCol="0" anchor="ctr">
+            <a:spAutoFit/>
+          </a:bodyPr>
+          <a:lstStyle/>
+          <a:p>
+            <a:pPr marL="0" marR="0" indent="0" algn="l" defTabSz="457200" rtl="0" fontAlgn="auto" latinLnBrk="0" hangingPunct="0">
+              <a:lnSpc>
+                <a:spcPct val="100000"/>
+              </a:lnSpc>
+              <a:spcBef>
+                <a:spcPts val="0"/>
+              </a:spcBef>
+              <a:spcAft>
+                <a:spcPts val="0"/>
+              </a:spcAft>
+              <a:buClrTx/>
+              <a:buSzTx/>
+              <a:buFontTx/>
+              <a:buNone/>
+              <a:tabLst/>
+            </a:pPr>
+            <a:endParaRPr kumimoji="0" lang="en-US" sz="1800" b="0" i="0" u="none" strike="noStrike" cap="none" spc="0" normalizeH="0" baseline="0">
+              <a:ln>
+                <a:noFill/>
+              </a:ln>
+              <a:solidFill>
+                <a:srgbClr val="000000"/>
+              </a:solidFill>
+              <a:effectLst/>
+              <a:uFillTx/>
+              <a:latin typeface="+mn-lt"/>
+              <a:ea typeface="+mn-ea"/>
+              <a:cs typeface="+mn-cs"/>
+              <a:sym typeface="Trebuchet MS"/>
+            </a:endParaRPr>
+          </a:p>
+        </p:txBody>
+      </p:sp>
+      <p:sp>
+        <p:nvSpPr>
+          <p:cNvPr id="8" name="Oval 7">
+            <a:extLst>
+              <a:ext uri="{FF2B5EF4-FFF2-40B4-BE49-F238E27FC236}">
+                <a16:creationId xmlns:a16="http://schemas.microsoft.com/office/drawing/2014/main" id="{68B0E482-3981-4A3B-89C5-159C5624A81E}"/>
+              </a:ext>
+            </a:extLst>
+          </p:cNvPr>
+          <p:cNvSpPr/>
+          <p:nvPr/>
+        </p:nvSpPr>
+        <p:spPr>
+          <a:xfrm>
+            <a:off x="6148687" y="1861464"/>
+            <a:ext cx="1019769" cy="881735"/>
+          </a:xfrm>
+          <a:prstGeom prst="ellipse">
+            <a:avLst/>
+          </a:prstGeom>
+          <a:solidFill>
+            <a:schemeClr val="bg1"/>
+          </a:solidFill>
+          <a:ln w="19050" cap="rnd">
+            <a:solidFill>
+              <a:srgbClr val="FF0000"/>
+            </a:solidFill>
+            <a:prstDash val="solid"/>
+            <a:round/>
+          </a:ln>
+          <a:effectLst/>
+          <a:scene3d>
+            <a:camera prst="orthographicFront">
+              <a:rot lat="0" lon="0" rev="0"/>
+            </a:camera>
+            <a:lightRig rig="chilly" dir="t">
+              <a:rot lat="0" lon="0" rev="18480000"/>
+            </a:lightRig>
+          </a:scene3d>
+          <a:sp3d prstMaterial="clear">
+            <a:bevelT h="63500"/>
+          </a:sp3d>
+        </p:spPr>
+        <p:style>
+          <a:lnRef idx="0">
+            <a:scrgbClr r="0" g="0" b="0"/>
+          </a:lnRef>
+          <a:fillRef idx="0">
+            <a:scrgbClr r="0" g="0" b="0"/>
+          </a:fillRef>
+          <a:effectRef idx="0">
+            <a:scrgbClr r="0" g="0" b="0"/>
+          </a:effectRef>
+          <a:fontRef idx="none"/>
+        </p:style>
+        <p:txBody>
+          <a:bodyPr rot="0" spcFirstLastPara="1" vertOverflow="overflow" horzOverflow="overflow" vert="horz" wrap="square" lIns="45719" tIns="45719" rIns="45719" bIns="45719" numCol="1" spcCol="38100" rtlCol="0" anchor="ctr">
+            <a:spAutoFit/>
+          </a:bodyPr>
+          <a:lstStyle/>
+          <a:p>
+            <a:pPr marL="0" marR="0" indent="0" algn="l" defTabSz="457200" rtl="0" fontAlgn="auto" latinLnBrk="0" hangingPunct="0">
+              <a:lnSpc>
+                <a:spcPct val="100000"/>
+              </a:lnSpc>
+              <a:spcBef>
+                <a:spcPts val="0"/>
+              </a:spcBef>
+              <a:spcAft>
+                <a:spcPts val="0"/>
+              </a:spcAft>
+              <a:buClrTx/>
+              <a:buSzTx/>
+              <a:buFontTx/>
+              <a:buNone/>
+              <a:tabLst/>
+            </a:pPr>
+            <a:endParaRPr kumimoji="0" lang="en-US" sz="1800" b="0" i="0" u="none" strike="noStrike" cap="none" spc="0" normalizeH="0" baseline="0">
+              <a:ln>
+                <a:noFill/>
+              </a:ln>
+              <a:solidFill>
+                <a:srgbClr val="000000"/>
+              </a:solidFill>
+              <a:effectLst/>
+              <a:uFillTx/>
+              <a:latin typeface="+mn-lt"/>
+              <a:ea typeface="+mn-ea"/>
+              <a:cs typeface="+mn-cs"/>
+              <a:sym typeface="Trebuchet MS"/>
+            </a:endParaRPr>
+          </a:p>
+        </p:txBody>
+      </p:sp>
+      <p:sp>
+        <p:nvSpPr>
+          <p:cNvPr id="9" name="Title 1">
+            <a:extLst>
+              <a:ext uri="{FF2B5EF4-FFF2-40B4-BE49-F238E27FC236}">
+                <a16:creationId xmlns:a16="http://schemas.microsoft.com/office/drawing/2014/main" id="{D173C4C4-A937-46CA-B4B8-DCD51F64F748}"/>
+              </a:ext>
+            </a:extLst>
+          </p:cNvPr>
+          <p:cNvSpPr txBox="1">
+            <a:spLocks/>
+          </p:cNvSpPr>
+          <p:nvPr/>
+        </p:nvSpPr>
+        <p:spPr>
+          <a:xfrm>
+            <a:off x="762000" y="3526217"/>
+            <a:ext cx="8596670" cy="567565"/>
           </a:xfrm>
           <a:prstGeom prst="rect">
             <a:avLst/>
           </a:prstGeom>
+          <a:ln w="12700">
+            <a:miter lim="400000"/>
+          </a:ln>
+          <a:extLst>
+            <a:ext uri="{C572A759-6A51-4108-AA02-DFA0A04FC94B}">
+              <ma14:wrappingTextBoxFlag xmlns:ma14="http://schemas.microsoft.com/office/mac/drawingml/2011/main" xmlns="" val="1"/>
+            </a:ext>
+          </a:extLst>
         </p:spPr>
         <p:txBody>
-          <a:bodyPr/>
-          <a:lstStyle/>
-          <a:p>
-            <a:endParaRPr/>
+          <a:bodyPr lIns="45719" rIns="45719">
+            <a:normAutofit fontScale="92500" lnSpcReduction="10000"/>
+          </a:bodyPr>
+          <a:lstStyle>
+            <a:lvl1pPr marL="0" marR="0" indent="0" algn="l" defTabSz="457200" rtl="0" latinLnBrk="0">
+              <a:lnSpc>
+                <a:spcPct val="100000"/>
+              </a:lnSpc>
+              <a:spcBef>
+                <a:spcPts val="0"/>
+              </a:spcBef>
+              <a:spcAft>
+                <a:spcPts val="0"/>
+              </a:spcAft>
+              <a:buClrTx/>
+              <a:buSzTx/>
+              <a:buFontTx/>
+              <a:buNone/>
+              <a:tabLst/>
+              <a:defRPr sz="3600" b="0" i="0" u="none" strike="noStrike" cap="none" spc="0" baseline="0">
+                <a:ln>
+                  <a:noFill/>
+                </a:ln>
+                <a:solidFill>
+                  <a:schemeClr val="accent1"/>
+                </a:solidFill>
+                <a:uFillTx/>
+                <a:latin typeface="+mn-lt"/>
+                <a:ea typeface="+mn-ea"/>
+                <a:cs typeface="+mn-cs"/>
+                <a:sym typeface="Trebuchet MS"/>
+              </a:defRPr>
+            </a:lvl1pPr>
+            <a:lvl2pPr marL="0" marR="0" indent="0" algn="l" defTabSz="457200" rtl="0" latinLnBrk="0">
+              <a:lnSpc>
+                <a:spcPct val="100000"/>
+              </a:lnSpc>
+              <a:spcBef>
+                <a:spcPts val="0"/>
+              </a:spcBef>
+              <a:spcAft>
+                <a:spcPts val="0"/>
+              </a:spcAft>
+              <a:buClrTx/>
+              <a:buSzTx/>
+              <a:buFontTx/>
+              <a:buNone/>
+              <a:tabLst/>
+              <a:defRPr sz="3600" b="0" i="0" u="none" strike="noStrike" cap="none" spc="0" baseline="0">
+                <a:ln>
+                  <a:noFill/>
+                </a:ln>
+                <a:solidFill>
+                  <a:schemeClr val="accent1"/>
+                </a:solidFill>
+                <a:uFillTx/>
+                <a:latin typeface="+mn-lt"/>
+                <a:ea typeface="+mn-ea"/>
+                <a:cs typeface="+mn-cs"/>
+                <a:sym typeface="Trebuchet MS"/>
+              </a:defRPr>
+            </a:lvl2pPr>
+            <a:lvl3pPr marL="0" marR="0" indent="0" algn="l" defTabSz="457200" rtl="0" latinLnBrk="0">
+              <a:lnSpc>
+                <a:spcPct val="100000"/>
+              </a:lnSpc>
+              <a:spcBef>
+                <a:spcPts val="0"/>
+              </a:spcBef>
+              <a:spcAft>
+                <a:spcPts val="0"/>
+              </a:spcAft>
+              <a:buClrTx/>
+              <a:buSzTx/>
+              <a:buFontTx/>
+              <a:buNone/>
+              <a:tabLst/>
+              <a:defRPr sz="3600" b="0" i="0" u="none" strike="noStrike" cap="none" spc="0" baseline="0">
+                <a:ln>
+                  <a:noFill/>
+                </a:ln>
+                <a:solidFill>
+                  <a:schemeClr val="accent1"/>
+                </a:solidFill>
+                <a:uFillTx/>
+                <a:latin typeface="+mn-lt"/>
+                <a:ea typeface="+mn-ea"/>
+                <a:cs typeface="+mn-cs"/>
+                <a:sym typeface="Trebuchet MS"/>
+              </a:defRPr>
+            </a:lvl3pPr>
+            <a:lvl4pPr marL="0" marR="0" indent="0" algn="l" defTabSz="457200" rtl="0" latinLnBrk="0">
+              <a:lnSpc>
+                <a:spcPct val="100000"/>
+              </a:lnSpc>
+              <a:spcBef>
+                <a:spcPts val="0"/>
+              </a:spcBef>
+              <a:spcAft>
+                <a:spcPts val="0"/>
+              </a:spcAft>
+              <a:buClrTx/>
+              <a:buSzTx/>
+              <a:buFontTx/>
+              <a:buNone/>
+              <a:tabLst/>
+              <a:defRPr sz="3600" b="0" i="0" u="none" strike="noStrike" cap="none" spc="0" baseline="0">
+                <a:ln>
+                  <a:noFill/>
+                </a:ln>
+                <a:solidFill>
+                  <a:schemeClr val="accent1"/>
+                </a:solidFill>
+                <a:uFillTx/>
+                <a:latin typeface="+mn-lt"/>
+                <a:ea typeface="+mn-ea"/>
+                <a:cs typeface="+mn-cs"/>
+                <a:sym typeface="Trebuchet MS"/>
+              </a:defRPr>
+            </a:lvl4pPr>
+            <a:lvl5pPr marL="0" marR="0" indent="0" algn="l" defTabSz="457200" rtl="0" latinLnBrk="0">
+              <a:lnSpc>
+                <a:spcPct val="100000"/>
+              </a:lnSpc>
+              <a:spcBef>
+                <a:spcPts val="0"/>
+              </a:spcBef>
+              <a:spcAft>
+                <a:spcPts val="0"/>
+              </a:spcAft>
+              <a:buClrTx/>
+              <a:buSzTx/>
+              <a:buFontTx/>
+              <a:buNone/>
+              <a:tabLst/>
+              <a:defRPr sz="3600" b="0" i="0" u="none" strike="noStrike" cap="none" spc="0" baseline="0">
+                <a:ln>
+                  <a:noFill/>
+                </a:ln>
+                <a:solidFill>
+                  <a:schemeClr val="accent1"/>
+                </a:solidFill>
+                <a:uFillTx/>
+                <a:latin typeface="+mn-lt"/>
+                <a:ea typeface="+mn-ea"/>
+                <a:cs typeface="+mn-cs"/>
+                <a:sym typeface="Trebuchet MS"/>
+              </a:defRPr>
+            </a:lvl5pPr>
+            <a:lvl6pPr marL="0" marR="0" indent="0" algn="l" defTabSz="457200" rtl="0" latinLnBrk="0">
+              <a:lnSpc>
+                <a:spcPct val="100000"/>
+              </a:lnSpc>
+              <a:spcBef>
+                <a:spcPts val="0"/>
+              </a:spcBef>
+              <a:spcAft>
+                <a:spcPts val="0"/>
+              </a:spcAft>
+              <a:buClrTx/>
+              <a:buSzTx/>
+              <a:buFontTx/>
+              <a:buNone/>
+              <a:tabLst/>
+              <a:defRPr sz="3600" b="0" i="0" u="none" strike="noStrike" cap="none" spc="0" baseline="0">
+                <a:ln>
+                  <a:noFill/>
+                </a:ln>
+                <a:solidFill>
+                  <a:schemeClr val="accent1"/>
+                </a:solidFill>
+                <a:uFillTx/>
+                <a:latin typeface="+mn-lt"/>
+                <a:ea typeface="+mn-ea"/>
+                <a:cs typeface="+mn-cs"/>
+                <a:sym typeface="Trebuchet MS"/>
+              </a:defRPr>
+            </a:lvl6pPr>
+            <a:lvl7pPr marL="0" marR="0" indent="0" algn="l" defTabSz="457200" rtl="0" latinLnBrk="0">
+              <a:lnSpc>
+                <a:spcPct val="100000"/>
+              </a:lnSpc>
+              <a:spcBef>
+                <a:spcPts val="0"/>
+              </a:spcBef>
+              <a:spcAft>
+                <a:spcPts val="0"/>
+              </a:spcAft>
+              <a:buClrTx/>
+              <a:buSzTx/>
+              <a:buFontTx/>
+              <a:buNone/>
+              <a:tabLst/>
+              <a:defRPr sz="3600" b="0" i="0" u="none" strike="noStrike" cap="none" spc="0" baseline="0">
+                <a:ln>
+                  <a:noFill/>
+                </a:ln>
+                <a:solidFill>
+                  <a:schemeClr val="accent1"/>
+                </a:solidFill>
+                <a:uFillTx/>
+                <a:latin typeface="+mn-lt"/>
+                <a:ea typeface="+mn-ea"/>
+                <a:cs typeface="+mn-cs"/>
+                <a:sym typeface="Trebuchet MS"/>
+              </a:defRPr>
+            </a:lvl7pPr>
+            <a:lvl8pPr marL="0" marR="0" indent="0" algn="l" defTabSz="457200" rtl="0" latinLnBrk="0">
+              <a:lnSpc>
+                <a:spcPct val="100000"/>
+              </a:lnSpc>
+              <a:spcBef>
+                <a:spcPts val="0"/>
+              </a:spcBef>
+              <a:spcAft>
+                <a:spcPts val="0"/>
+              </a:spcAft>
+              <a:buClrTx/>
+              <a:buSzTx/>
+              <a:buFontTx/>
+              <a:buNone/>
+              <a:tabLst/>
+              <a:defRPr sz="3600" b="0" i="0" u="none" strike="noStrike" cap="none" spc="0" baseline="0">
+                <a:ln>
+                  <a:noFill/>
+                </a:ln>
+                <a:solidFill>
+                  <a:schemeClr val="accent1"/>
+                </a:solidFill>
+                <a:uFillTx/>
+                <a:latin typeface="+mn-lt"/>
+                <a:ea typeface="+mn-ea"/>
+                <a:cs typeface="+mn-cs"/>
+                <a:sym typeface="Trebuchet MS"/>
+              </a:defRPr>
+            </a:lvl8pPr>
+            <a:lvl9pPr marL="0" marR="0" indent="0" algn="l" defTabSz="457200" rtl="0" latinLnBrk="0">
+              <a:lnSpc>
+                <a:spcPct val="100000"/>
+              </a:lnSpc>
+              <a:spcBef>
+                <a:spcPts val="0"/>
+              </a:spcBef>
+              <a:spcAft>
+                <a:spcPts val="0"/>
+              </a:spcAft>
+              <a:buClrTx/>
+              <a:buSzTx/>
+              <a:buFontTx/>
+              <a:buNone/>
+              <a:tabLst/>
+              <a:defRPr sz="3600" b="0" i="0" u="none" strike="noStrike" cap="none" spc="0" baseline="0">
+                <a:ln>
+                  <a:noFill/>
+                </a:ln>
+                <a:solidFill>
+                  <a:schemeClr val="accent1"/>
+                </a:solidFill>
+                <a:uFillTx/>
+                <a:latin typeface="+mn-lt"/>
+                <a:ea typeface="+mn-ea"/>
+                <a:cs typeface="+mn-cs"/>
+                <a:sym typeface="Trebuchet MS"/>
+              </a:defRPr>
+            </a:lvl9pPr>
+          </a:lstStyle>
+          <a:p>
+            <a:pPr hangingPunct="1"/>
+            <a:r>
+              <a:rPr lang="en-US" dirty="0"/>
+              <a:t>Positive Aspects</a:t>
+            </a:r>
+          </a:p>
+        </p:txBody>
+      </p:sp>
+      <p:sp>
+        <p:nvSpPr>
+          <p:cNvPr id="11" name="Text Placeholder 2">
+            <a:extLst>
+              <a:ext uri="{FF2B5EF4-FFF2-40B4-BE49-F238E27FC236}">
+                <a16:creationId xmlns:a16="http://schemas.microsoft.com/office/drawing/2014/main" id="{C2A0FF3F-4712-40EB-A87A-102B06914EC6}"/>
+              </a:ext>
+            </a:extLst>
+          </p:cNvPr>
+          <p:cNvSpPr txBox="1">
+            <a:spLocks/>
+          </p:cNvSpPr>
+          <p:nvPr/>
+        </p:nvSpPr>
+        <p:spPr>
+          <a:xfrm>
+            <a:off x="677333" y="4161182"/>
+            <a:ext cx="8596670" cy="2438399"/>
+          </a:xfrm>
+          <a:prstGeom prst="rect">
+            <a:avLst/>
+          </a:prstGeom>
+          <a:ln w="12700">
+            <a:miter lim="400000"/>
+          </a:ln>
+          <a:extLst>
+            <a:ext uri="{C572A759-6A51-4108-AA02-DFA0A04FC94B}">
+              <ma14:wrappingTextBoxFlag xmlns:ma14="http://schemas.microsoft.com/office/mac/drawingml/2011/main" xmlns="" val="1"/>
+            </a:ext>
+          </a:extLst>
+        </p:spPr>
+        <p:txBody>
+          <a:bodyPr lIns="45719" rIns="45719">
+            <a:normAutofit/>
+          </a:bodyPr>
+          <a:lstStyle>
+            <a:lvl1pPr marL="342900" marR="0" indent="-342900" algn="l" defTabSz="457200" rtl="0" latinLnBrk="0">
+              <a:lnSpc>
+                <a:spcPct val="100000"/>
+              </a:lnSpc>
+              <a:spcBef>
+                <a:spcPts val="1000"/>
+              </a:spcBef>
+              <a:spcAft>
+                <a:spcPts val="0"/>
+              </a:spcAft>
+              <a:buClr>
+                <a:schemeClr val="accent1"/>
+              </a:buClr>
+              <a:buSzPct val="80000"/>
+              <a:buFontTx/>
+              <a:buChar char=""/>
+              <a:tabLst/>
+              <a:defRPr sz="1800" b="0" i="0" u="none" strike="noStrike" cap="none" spc="0" baseline="0">
+                <a:ln>
+                  <a:noFill/>
+                </a:ln>
+                <a:solidFill>
+                  <a:srgbClr val="404040"/>
+                </a:solidFill>
+                <a:uFillTx/>
+                <a:latin typeface="+mn-lt"/>
+                <a:ea typeface="+mn-ea"/>
+                <a:cs typeface="+mn-cs"/>
+                <a:sym typeface="Trebuchet MS"/>
+              </a:defRPr>
+            </a:lvl1pPr>
+            <a:lvl2pPr marL="778668" marR="0" indent="-321468" algn="l" defTabSz="457200" rtl="0" latinLnBrk="0">
+              <a:lnSpc>
+                <a:spcPct val="100000"/>
+              </a:lnSpc>
+              <a:spcBef>
+                <a:spcPts val="1000"/>
+              </a:spcBef>
+              <a:spcAft>
+                <a:spcPts val="0"/>
+              </a:spcAft>
+              <a:buClr>
+                <a:schemeClr val="accent1"/>
+              </a:buClr>
+              <a:buSzPct val="80000"/>
+              <a:buFontTx/>
+              <a:buChar char=""/>
+              <a:tabLst/>
+              <a:defRPr sz="1800" b="0" i="0" u="none" strike="noStrike" cap="none" spc="0" baseline="0">
+                <a:ln>
+                  <a:noFill/>
+                </a:ln>
+                <a:solidFill>
+                  <a:srgbClr val="404040"/>
+                </a:solidFill>
+                <a:uFillTx/>
+                <a:latin typeface="+mn-lt"/>
+                <a:ea typeface="+mn-ea"/>
+                <a:cs typeface="+mn-cs"/>
+                <a:sym typeface="Trebuchet MS"/>
+              </a:defRPr>
+            </a:lvl2pPr>
+            <a:lvl3pPr marL="1208314" marR="0" indent="-293914" algn="l" defTabSz="457200" rtl="0" latinLnBrk="0">
+              <a:lnSpc>
+                <a:spcPct val="100000"/>
+              </a:lnSpc>
+              <a:spcBef>
+                <a:spcPts val="1000"/>
+              </a:spcBef>
+              <a:spcAft>
+                <a:spcPts val="0"/>
+              </a:spcAft>
+              <a:buClr>
+                <a:schemeClr val="accent1"/>
+              </a:buClr>
+              <a:buSzPct val="80000"/>
+              <a:buFontTx/>
+              <a:buChar char=""/>
+              <a:tabLst/>
+              <a:defRPr sz="1800" b="0" i="0" u="none" strike="noStrike" cap="none" spc="0" baseline="0">
+                <a:ln>
+                  <a:noFill/>
+                </a:ln>
+                <a:solidFill>
+                  <a:srgbClr val="404040"/>
+                </a:solidFill>
+                <a:uFillTx/>
+                <a:latin typeface="+mn-lt"/>
+                <a:ea typeface="+mn-ea"/>
+                <a:cs typeface="+mn-cs"/>
+                <a:sym typeface="Trebuchet MS"/>
+              </a:defRPr>
+            </a:lvl3pPr>
+            <a:lvl4pPr marL="1714500" marR="0" indent="-342900" algn="l" defTabSz="457200" rtl="0" latinLnBrk="0">
+              <a:lnSpc>
+                <a:spcPct val="100000"/>
+              </a:lnSpc>
+              <a:spcBef>
+                <a:spcPts val="1000"/>
+              </a:spcBef>
+              <a:spcAft>
+                <a:spcPts val="0"/>
+              </a:spcAft>
+              <a:buClr>
+                <a:schemeClr val="accent1"/>
+              </a:buClr>
+              <a:buSzPct val="80000"/>
+              <a:buFontTx/>
+              <a:buChar char=""/>
+              <a:tabLst/>
+              <a:defRPr sz="1800" b="0" i="0" u="none" strike="noStrike" cap="none" spc="0" baseline="0">
+                <a:ln>
+                  <a:noFill/>
+                </a:ln>
+                <a:solidFill>
+                  <a:srgbClr val="404040"/>
+                </a:solidFill>
+                <a:uFillTx/>
+                <a:latin typeface="+mn-lt"/>
+                <a:ea typeface="+mn-ea"/>
+                <a:cs typeface="+mn-cs"/>
+                <a:sym typeface="Trebuchet MS"/>
+              </a:defRPr>
+            </a:lvl4pPr>
+            <a:lvl5pPr marL="2171700" marR="0" indent="-342900" algn="l" defTabSz="457200" rtl="0" latinLnBrk="0">
+              <a:lnSpc>
+                <a:spcPct val="100000"/>
+              </a:lnSpc>
+              <a:spcBef>
+                <a:spcPts val="1000"/>
+              </a:spcBef>
+              <a:spcAft>
+                <a:spcPts val="0"/>
+              </a:spcAft>
+              <a:buClr>
+                <a:schemeClr val="accent1"/>
+              </a:buClr>
+              <a:buSzPct val="80000"/>
+              <a:buFontTx/>
+              <a:buChar char=""/>
+              <a:tabLst/>
+              <a:defRPr sz="1800" b="0" i="0" u="none" strike="noStrike" cap="none" spc="0" baseline="0">
+                <a:ln>
+                  <a:noFill/>
+                </a:ln>
+                <a:solidFill>
+                  <a:srgbClr val="404040"/>
+                </a:solidFill>
+                <a:uFillTx/>
+                <a:latin typeface="+mn-lt"/>
+                <a:ea typeface="+mn-ea"/>
+                <a:cs typeface="+mn-cs"/>
+                <a:sym typeface="Trebuchet MS"/>
+              </a:defRPr>
+            </a:lvl5pPr>
+            <a:lvl6pPr marL="2628900" marR="0" indent="-342900" algn="l" defTabSz="457200" rtl="0" latinLnBrk="0">
+              <a:lnSpc>
+                <a:spcPct val="100000"/>
+              </a:lnSpc>
+              <a:spcBef>
+                <a:spcPts val="1000"/>
+              </a:spcBef>
+              <a:spcAft>
+                <a:spcPts val="0"/>
+              </a:spcAft>
+              <a:buClr>
+                <a:schemeClr val="accent1"/>
+              </a:buClr>
+              <a:buSzPct val="80000"/>
+              <a:buFontTx/>
+              <a:buChar char=""/>
+              <a:tabLst/>
+              <a:defRPr sz="1800" b="0" i="0" u="none" strike="noStrike" cap="none" spc="0" baseline="0">
+                <a:ln>
+                  <a:noFill/>
+                </a:ln>
+                <a:solidFill>
+                  <a:srgbClr val="404040"/>
+                </a:solidFill>
+                <a:uFillTx/>
+                <a:latin typeface="+mn-lt"/>
+                <a:ea typeface="+mn-ea"/>
+                <a:cs typeface="+mn-cs"/>
+                <a:sym typeface="Trebuchet MS"/>
+              </a:defRPr>
+            </a:lvl6pPr>
+            <a:lvl7pPr marL="3086100" marR="0" indent="-342900" algn="l" defTabSz="457200" rtl="0" latinLnBrk="0">
+              <a:lnSpc>
+                <a:spcPct val="100000"/>
+              </a:lnSpc>
+              <a:spcBef>
+                <a:spcPts val="1000"/>
+              </a:spcBef>
+              <a:spcAft>
+                <a:spcPts val="0"/>
+              </a:spcAft>
+              <a:buClr>
+                <a:schemeClr val="accent1"/>
+              </a:buClr>
+              <a:buSzPct val="80000"/>
+              <a:buFontTx/>
+              <a:buChar char=""/>
+              <a:tabLst/>
+              <a:defRPr sz="1800" b="0" i="0" u="none" strike="noStrike" cap="none" spc="0" baseline="0">
+                <a:ln>
+                  <a:noFill/>
+                </a:ln>
+                <a:solidFill>
+                  <a:srgbClr val="404040"/>
+                </a:solidFill>
+                <a:uFillTx/>
+                <a:latin typeface="+mn-lt"/>
+                <a:ea typeface="+mn-ea"/>
+                <a:cs typeface="+mn-cs"/>
+                <a:sym typeface="Trebuchet MS"/>
+              </a:defRPr>
+            </a:lvl7pPr>
+            <a:lvl8pPr marL="3543300" marR="0" indent="-342900" algn="l" defTabSz="457200" rtl="0" latinLnBrk="0">
+              <a:lnSpc>
+                <a:spcPct val="100000"/>
+              </a:lnSpc>
+              <a:spcBef>
+                <a:spcPts val="1000"/>
+              </a:spcBef>
+              <a:spcAft>
+                <a:spcPts val="0"/>
+              </a:spcAft>
+              <a:buClr>
+                <a:schemeClr val="accent1"/>
+              </a:buClr>
+              <a:buSzPct val="80000"/>
+              <a:buFontTx/>
+              <a:buChar char=""/>
+              <a:tabLst/>
+              <a:defRPr sz="1800" b="0" i="0" u="none" strike="noStrike" cap="none" spc="0" baseline="0">
+                <a:ln>
+                  <a:noFill/>
+                </a:ln>
+                <a:solidFill>
+                  <a:srgbClr val="404040"/>
+                </a:solidFill>
+                <a:uFillTx/>
+                <a:latin typeface="+mn-lt"/>
+                <a:ea typeface="+mn-ea"/>
+                <a:cs typeface="+mn-cs"/>
+                <a:sym typeface="Trebuchet MS"/>
+              </a:defRPr>
+            </a:lvl8pPr>
+            <a:lvl9pPr marL="4000500" marR="0" indent="-342900" algn="l" defTabSz="457200" rtl="0" latinLnBrk="0">
+              <a:lnSpc>
+                <a:spcPct val="100000"/>
+              </a:lnSpc>
+              <a:spcBef>
+                <a:spcPts val="1000"/>
+              </a:spcBef>
+              <a:spcAft>
+                <a:spcPts val="0"/>
+              </a:spcAft>
+              <a:buClr>
+                <a:schemeClr val="accent1"/>
+              </a:buClr>
+              <a:buSzPct val="80000"/>
+              <a:buFontTx/>
+              <a:buChar char=""/>
+              <a:tabLst/>
+              <a:defRPr sz="1800" b="0" i="0" u="none" strike="noStrike" cap="none" spc="0" baseline="0">
+                <a:ln>
+                  <a:noFill/>
+                </a:ln>
+                <a:solidFill>
+                  <a:srgbClr val="404040"/>
+                </a:solidFill>
+                <a:uFillTx/>
+                <a:latin typeface="+mn-lt"/>
+                <a:ea typeface="+mn-ea"/>
+                <a:cs typeface="+mn-cs"/>
+                <a:sym typeface="Trebuchet MS"/>
+              </a:defRPr>
+            </a:lvl9pPr>
+          </a:lstStyle>
+          <a:p>
+            <a:pPr hangingPunct="1"/>
+            <a:r>
+              <a:rPr lang="en-US" dirty="0"/>
+              <a:t>Connecting Developers and users directly</a:t>
+            </a:r>
+          </a:p>
+          <a:p>
+            <a:pPr hangingPunct="1"/>
+            <a:r>
+              <a:rPr lang="en-US" dirty="0"/>
+              <a:t>Identifying the most common issues and responding in priority</a:t>
+            </a:r>
+          </a:p>
+          <a:p>
+            <a:pPr hangingPunct="1"/>
+            <a:r>
+              <a:rPr lang="en-US" dirty="0"/>
+              <a:t>Varied devices and versions have various outcomes</a:t>
+            </a:r>
+          </a:p>
+          <a:p>
+            <a:pPr hangingPunct="1"/>
+            <a:r>
+              <a:rPr lang="en-US" dirty="0"/>
+              <a:t>Categorizing the reviews and analyzing the reports</a:t>
+            </a:r>
+          </a:p>
+          <a:p>
+            <a:pPr hangingPunct="1"/>
+            <a:r>
+              <a:rPr lang="en-US" dirty="0"/>
+              <a:t>Improved ratings and app functionality</a:t>
+            </a:r>
+          </a:p>
+          <a:p>
+            <a:pPr marL="0" indent="0" hangingPunct="1">
+              <a:buFontTx/>
+              <a:buNone/>
+            </a:pPr>
+            <a:endParaRPr lang="en-US" dirty="0"/>
+          </a:p>
+          <a:p>
+            <a:pPr hangingPunct="1"/>
+            <a:endParaRPr lang="en-US" dirty="0"/>
+          </a:p>
+          <a:p>
+            <a:pPr hangingPunct="1"/>
+            <a:endParaRPr lang="en-US" dirty="0"/>
           </a:p>
         </p:txBody>
       </p:sp>
     </p:spTree>
+    <p:extLst>
+      <p:ext uri="{BB962C8B-B14F-4D97-AF65-F5344CB8AC3E}">
+        <p14:creationId xmlns:p14="http://schemas.microsoft.com/office/powerpoint/2010/main" val="49298284"/>
+      </p:ext>
+    </p:extLst>
   </p:cSld>
   <p:clrMapOvr>
     <a:masterClrMapping/>
@@ -5935,7 +7547,7 @@
           <a:lstStyle/>
           <a:p>
             <a:r>
-              <a:rPr lang="en-US" dirty="0" smtClean="0"/>
+              <a:rPr lang="en-US" dirty="0"/>
               <a:t>General Criticisms</a:t>
             </a:r>
             <a:endParaRPr dirty="0"/>
@@ -5966,16 +7578,16 @@
           <a:lstStyle/>
           <a:p>
             <a:r>
-              <a:rPr lang="en-US" dirty="0" smtClean="0"/>
+              <a:rPr lang="en-US" dirty="0"/>
               <a:t>Positive Criticism – the study attempted to investigate an area that had no previous research done on it, and they attempted to do it in an empirical way, and they are aware that their approach has limitations</a:t>
             </a:r>
           </a:p>
           <a:p>
-            <a:endParaRPr lang="en-US" dirty="0" smtClean="0"/>
-          </a:p>
-          <a:p>
-            <a:r>
-              <a:rPr lang="en-US" dirty="0" smtClean="0"/>
+            <a:endParaRPr lang="en-US" dirty="0"/>
+          </a:p>
+          <a:p>
+            <a:r>
+              <a:rPr lang="en-US" dirty="0"/>
               <a:t>Negative Criticism – the study only focused on the Google Play App store’s free apps, and only used data from 2013, and looked at apps that were popular a year before</a:t>
             </a:r>
             <a:endParaRPr dirty="0"/>
@@ -6024,10 +7636,9 @@
           <a:lstStyle/>
           <a:p>
             <a:r>
-              <a:rPr lang="en-US" dirty="0" smtClean="0"/>
+              <a:rPr lang="en-US" dirty="0"/>
               <a:t>Negative Aspects</a:t>
             </a:r>
-            <a:endParaRPr lang="en-US" dirty="0"/>
           </a:p>
         </p:txBody>
       </p:sp>
@@ -6047,57 +7658,56 @@
           <a:lstStyle/>
           <a:p>
             <a:r>
-              <a:rPr lang="en-US" dirty="0" smtClean="0"/>
+              <a:rPr lang="en-US" dirty="0"/>
               <a:t>App popularity was based off one source, </a:t>
             </a:r>
             <a:r>
-              <a:rPr lang="en-US" dirty="0" err="1" smtClean="0"/>
+              <a:rPr lang="en-US" dirty="0" err="1"/>
               <a:t>Distimo</a:t>
             </a:r>
-            <a:endParaRPr lang="en-US" dirty="0" smtClean="0"/>
-          </a:p>
-          <a:p>
-            <a:r>
-              <a:rPr lang="en-US" dirty="0" smtClean="0"/>
+            <a:endParaRPr lang="en-US" dirty="0"/>
+          </a:p>
+          <a:p>
+            <a:r>
+              <a:rPr lang="en-US" dirty="0"/>
               <a:t>Some apps may be limited by the phone and operating system type</a:t>
             </a:r>
           </a:p>
           <a:p>
             <a:r>
-              <a:rPr lang="en-US" dirty="0" smtClean="0"/>
+              <a:rPr lang="en-US" dirty="0"/>
               <a:t>Limitations in the app stores prevent getting a full picture from the reviews</a:t>
             </a:r>
           </a:p>
           <a:p>
             <a:r>
-              <a:rPr lang="en-US" dirty="0" smtClean="0"/>
+              <a:rPr lang="en-US" dirty="0"/>
               <a:t>Only apps from one year prior were considered for the study</a:t>
             </a:r>
           </a:p>
           <a:p>
             <a:r>
-              <a:rPr lang="en-US" dirty="0" smtClean="0"/>
+              <a:rPr lang="en-US" dirty="0"/>
               <a:t>The window for observing change was only 20 days in April</a:t>
             </a:r>
           </a:p>
           <a:p>
             <a:r>
-              <a:rPr lang="en-US" dirty="0" smtClean="0"/>
+              <a:rPr lang="en-US" dirty="0"/>
               <a:t>Very few developers responded to reviews(around 14%)</a:t>
             </a:r>
           </a:p>
           <a:p>
             <a:r>
-              <a:rPr lang="en-US" dirty="0" smtClean="0"/>
+              <a:rPr lang="en-US" dirty="0"/>
               <a:t>Limited understanding of an apps domains limited the analysis</a:t>
             </a:r>
           </a:p>
           <a:p>
             <a:r>
-              <a:rPr lang="en-US" dirty="0" smtClean="0"/>
+              <a:rPr lang="en-US" dirty="0"/>
               <a:t>Non English language, or incoherent reviews were put in the same category</a:t>
             </a:r>
-            <a:endParaRPr lang="en-US" dirty="0"/>
           </a:p>
         </p:txBody>
       </p:sp>
@@ -6151,10 +7761,9 @@
           <a:lstStyle/>
           <a:p>
             <a:r>
-              <a:rPr dirty="0" smtClean="0"/>
+              <a:rPr dirty="0"/>
               <a:t>Questions</a:t>
             </a:r>
-            <a:endParaRPr dirty="0"/>
           </a:p>
         </p:txBody>
       </p:sp>
@@ -6242,10 +7851,9 @@
           <a:lstStyle/>
           <a:p>
             <a:r>
-              <a:rPr lang="en-US" dirty="0" smtClean="0"/>
+              <a:rPr lang="en-US" dirty="0"/>
               <a:t>Questions (cont’d)</a:t>
             </a:r>
-            <a:endParaRPr lang="en-US" dirty="0"/>
           </a:p>
         </p:txBody>
       </p:sp>
@@ -6259,12 +7867,63 @@
             <p:ph type="body" sz="half" idx="1"/>
           </p:nvPr>
         </p:nvSpPr>
-        <p:spPr/>
+        <p:spPr>
+          <a:xfrm>
+            <a:off x="677333" y="2160589"/>
+            <a:ext cx="8596670" cy="3706811"/>
+          </a:xfrm>
+        </p:spPr>
         <p:txBody>
-          <a:bodyPr/>
+          <a:bodyPr>
+            <a:normAutofit/>
+          </a:bodyPr>
           <a:lstStyle/>
           <a:p>
-            <a:endParaRPr lang="en-US"/>
+            <a:r>
+              <a:rPr lang="en-US" dirty="0"/>
+              <a:t>Which analysis is better to convince that developer’s response could increase the rating ? And in what terms ?</a:t>
+            </a:r>
+          </a:p>
+          <a:p>
+            <a:pPr marL="0" indent="0">
+              <a:buNone/>
+            </a:pPr>
+            <a:endParaRPr lang="en-US" dirty="0"/>
+          </a:p>
+          <a:p>
+            <a:pPr marL="0" indent="0">
+              <a:buNone/>
+            </a:pPr>
+            <a:endParaRPr lang="en-US" dirty="0"/>
+          </a:p>
+          <a:p>
+            <a:r>
+              <a:rPr lang="en-US" dirty="0"/>
+              <a:t>Can the research be relied on data provided by </a:t>
+            </a:r>
+            <a:r>
+              <a:rPr lang="en-US" dirty="0" err="1"/>
+              <a:t>Distimo</a:t>
+            </a:r>
+            <a:r>
+              <a:rPr lang="en-US" dirty="0"/>
+              <a:t> -  the single source ?</a:t>
+            </a:r>
+          </a:p>
+          <a:p>
+            <a:endParaRPr lang="en-US" dirty="0"/>
+          </a:p>
+          <a:p>
+            <a:pPr marL="0" indent="0">
+              <a:buNone/>
+            </a:pPr>
+            <a:endParaRPr lang="en-US" dirty="0"/>
+          </a:p>
+          <a:p>
+            <a:r>
+              <a:rPr lang="en-US" dirty="0"/>
+              <a:t>Reviews in other languages are separated, what % of them were not considered which could impact the research?</a:t>
+            </a:r>
           </a:p>
         </p:txBody>
       </p:sp>
@@ -6306,7 +7965,7 @@
         </p:nvSpPr>
         <p:spPr>
           <a:xfrm>
-            <a:off x="2734733" y="2019300"/>
+            <a:off x="3429000" y="2768600"/>
             <a:ext cx="3491468" cy="1320800"/>
           </a:xfrm>
           <a:prstGeom prst="rect">

</xml_diff>